<commit_message>
Re-uploading correct version of Powerpoint slides
</commit_message>
<xml_diff>
--- a/Kagdi2013_Wong.pptx
+++ b/Kagdi2013_Wong.pptx
@@ -6307,6 +6307,48 @@
           </a:graphicData>
         </a:graphic>
       </p:graphicFrame>
+      <p:sp>
+        <p:nvSpPr>
+          <p:cNvPr id="10" name="Rectangle 9">
+            <a:hlinkClick r:id="rId3" action="ppaction://hlinksldjump"/>
+          </p:cNvPr>
+          <p:cNvSpPr/>
+          <p:nvPr/>
+        </p:nvSpPr>
+        <p:spPr>
+          <a:xfrm>
+            <a:off x="71021" y="6447370"/>
+            <a:ext cx="355107" cy="363984"/>
+          </a:xfrm>
+          <a:prstGeom prst="rect">
+            <a:avLst/>
+          </a:prstGeom>
+        </p:spPr>
+        <p:style>
+          <a:lnRef idx="2">
+            <a:schemeClr val="accent1">
+              <a:shade val="50000"/>
+            </a:schemeClr>
+          </a:lnRef>
+          <a:fillRef idx="1">
+            <a:schemeClr val="accent1"/>
+          </a:fillRef>
+          <a:effectRef idx="0">
+            <a:schemeClr val="accent1"/>
+          </a:effectRef>
+          <a:fontRef idx="minor">
+            <a:schemeClr val="lt1"/>
+          </a:fontRef>
+        </p:style>
+        <p:txBody>
+          <a:bodyPr rtlCol="0" anchor="ctr"/>
+          <a:lstStyle/>
+          <a:p>
+            <a:pPr algn="ctr"/>
+            <a:endParaRPr lang="en-US"/>
+          </a:p>
+        </p:txBody>
+      </p:sp>
     </p:spTree>
     <p:extLst>
       <p:ext uri="{BB962C8B-B14F-4D97-AF65-F5344CB8AC3E}">
@@ -7483,8 +7525,8 @@
         </p:nvSpPr>
         <p:spPr>
           <a:xfrm>
-            <a:off x="332634" y="3106350"/>
-            <a:ext cx="3633903" cy="1815882"/>
+            <a:off x="159374" y="3098398"/>
+            <a:ext cx="3976208" cy="1569660"/>
           </a:xfrm>
           <a:prstGeom prst="rect">
             <a:avLst/>
@@ -7499,21 +7541,17 @@
           <a:p>
             <a:pPr algn="ctr"/>
             <a:r>
-              <a:rPr lang="en-US" sz="2800" dirty="0" smtClean="0"/>
+              <a:rPr lang="en-US" sz="3200" dirty="0" smtClean="0"/>
               <a:t>File-Level Granularity, F-Measure Percentage</a:t>
             </a:r>
           </a:p>
           <a:p>
             <a:pPr algn="ctr"/>
-            <a:endParaRPr lang="en-US" sz="2800" dirty="0"/>
-          </a:p>
-          <a:p>
-            <a:pPr algn="ctr"/>
-            <a:r>
-              <a:rPr lang="en-US" sz="2800" dirty="0" smtClean="0"/>
+            <a:r>
+              <a:rPr lang="en-US" sz="3200" dirty="0" smtClean="0"/>
               <a:t>Table</a:t>
             </a:r>
-            <a:endParaRPr lang="en-US" sz="2800" dirty="0"/>
+            <a:endParaRPr lang="en-US" sz="3200" dirty="0"/>
           </a:p>
         </p:txBody>
       </p:sp>
@@ -7806,6 +7844,48 @@
               <a:alpha val="25098"/>
             </a:srgbClr>
           </a:solidFill>
+        </p:spPr>
+        <p:style>
+          <a:lnRef idx="2">
+            <a:schemeClr val="accent1">
+              <a:shade val="50000"/>
+            </a:schemeClr>
+          </a:lnRef>
+          <a:fillRef idx="1">
+            <a:schemeClr val="accent1"/>
+          </a:fillRef>
+          <a:effectRef idx="0">
+            <a:schemeClr val="accent1"/>
+          </a:effectRef>
+          <a:fontRef idx="minor">
+            <a:schemeClr val="lt1"/>
+          </a:fontRef>
+        </p:style>
+        <p:txBody>
+          <a:bodyPr rtlCol="0" anchor="ctr"/>
+          <a:lstStyle/>
+          <a:p>
+            <a:pPr algn="ctr"/>
+            <a:endParaRPr lang="en-US"/>
+          </a:p>
+        </p:txBody>
+      </p:sp>
+      <p:sp>
+        <p:nvSpPr>
+          <p:cNvPr id="3" name="Rectangle 2">
+            <a:hlinkClick r:id="rId3" action="ppaction://hlinksldjump"/>
+          </p:cNvPr>
+          <p:cNvSpPr/>
+          <p:nvPr/>
+        </p:nvSpPr>
+        <p:spPr>
+          <a:xfrm>
+            <a:off x="71021" y="6447370"/>
+            <a:ext cx="355107" cy="363984"/>
+          </a:xfrm>
+          <a:prstGeom prst="rect">
+            <a:avLst/>
+          </a:prstGeom>
         </p:spPr>
         <p:style>
           <a:lnRef idx="2">
@@ -8105,45 +8185,6 @@
       </p:sp>
       <p:sp>
         <p:nvSpPr>
-          <p:cNvPr id="5" name="TextBox 4"/>
-          <p:cNvSpPr txBox="1"/>
-          <p:nvPr/>
-        </p:nvSpPr>
-        <p:spPr>
-          <a:xfrm>
-            <a:off x="859295" y="3277448"/>
-            <a:ext cx="2805546" cy="1200329"/>
-          </a:xfrm>
-          <a:prstGeom prst="rect">
-            <a:avLst/>
-          </a:prstGeom>
-          <a:noFill/>
-        </p:spPr>
-        <p:txBody>
-          <a:bodyPr wrap="square" rtlCol="0">
-            <a:spAutoFit/>
-          </a:bodyPr>
-          <a:lstStyle/>
-          <a:p>
-            <a:r>
-              <a:rPr lang="en-US" dirty="0" smtClean="0"/>
-              <a:t>Method-Level Granularity, F-Measure Percentage</a:t>
-            </a:r>
-          </a:p>
-          <a:p>
-            <a:endParaRPr lang="en-US" dirty="0"/>
-          </a:p>
-          <a:p>
-            <a:r>
-              <a:rPr lang="en-US" dirty="0" smtClean="0"/>
-              <a:t>Table</a:t>
-            </a:r>
-            <a:endParaRPr lang="en-US" dirty="0"/>
-          </a:p>
-        </p:txBody>
-      </p:sp>
-      <p:sp>
-        <p:nvSpPr>
           <p:cNvPr id="8" name="Rectangle 7"/>
           <p:cNvSpPr/>
           <p:nvPr/>
@@ -8386,6 +8427,91 @@
               <a:alpha val="25098"/>
             </a:srgbClr>
           </a:solidFill>
+        </p:spPr>
+        <p:style>
+          <a:lnRef idx="2">
+            <a:schemeClr val="accent1">
+              <a:shade val="50000"/>
+            </a:schemeClr>
+          </a:lnRef>
+          <a:fillRef idx="1">
+            <a:schemeClr val="accent1"/>
+          </a:fillRef>
+          <a:effectRef idx="0">
+            <a:schemeClr val="accent1"/>
+          </a:effectRef>
+          <a:fontRef idx="minor">
+            <a:schemeClr val="lt1"/>
+          </a:fontRef>
+        </p:style>
+        <p:txBody>
+          <a:bodyPr rtlCol="0" anchor="ctr"/>
+          <a:lstStyle/>
+          <a:p>
+            <a:pPr algn="ctr"/>
+            <a:endParaRPr lang="en-US"/>
+          </a:p>
+        </p:txBody>
+      </p:sp>
+      <p:sp>
+        <p:nvSpPr>
+          <p:cNvPr id="12" name="TextBox 11"/>
+          <p:cNvSpPr txBox="1"/>
+          <p:nvPr/>
+        </p:nvSpPr>
+        <p:spPr>
+          <a:xfrm>
+            <a:off x="159374" y="3098398"/>
+            <a:ext cx="3976208" cy="1569660"/>
+          </a:xfrm>
+          <a:prstGeom prst="rect">
+            <a:avLst/>
+          </a:prstGeom>
+          <a:noFill/>
+        </p:spPr>
+        <p:txBody>
+          <a:bodyPr wrap="square" rtlCol="0">
+            <a:spAutoFit/>
+          </a:bodyPr>
+          <a:lstStyle/>
+          <a:p>
+            <a:pPr algn="ctr"/>
+            <a:r>
+              <a:rPr lang="en-US" sz="3200" dirty="0" smtClean="0"/>
+              <a:t>Method</a:t>
+            </a:r>
+            <a:r>
+              <a:rPr lang="en-US" sz="3200" dirty="0" smtClean="0"/>
+              <a:t>-Level </a:t>
+            </a:r>
+            <a:r>
+              <a:rPr lang="en-US" sz="3200" dirty="0" smtClean="0"/>
+              <a:t>Granularity, F-Measure </a:t>
+            </a:r>
+            <a:r>
+              <a:rPr lang="en-US" sz="3200" dirty="0" smtClean="0"/>
+              <a:t>Percentage Table</a:t>
+            </a:r>
+            <a:endParaRPr lang="en-US" sz="3200" dirty="0"/>
+          </a:p>
+        </p:txBody>
+      </p:sp>
+      <p:sp>
+        <p:nvSpPr>
+          <p:cNvPr id="15" name="Rectangle 14">
+            <a:hlinkClick r:id="rId3" action="ppaction://hlinksldjump"/>
+          </p:cNvPr>
+          <p:cNvSpPr/>
+          <p:nvPr/>
+        </p:nvSpPr>
+        <p:spPr>
+          <a:xfrm>
+            <a:off x="71021" y="6447370"/>
+            <a:ext cx="355107" cy="363984"/>
+          </a:xfrm>
+          <a:prstGeom prst="rect">
+            <a:avLst/>
+          </a:prstGeom>
         </p:spPr>
         <p:style>
           <a:lnRef idx="2">
@@ -8642,45 +8768,6 @@
       </p:pic>
       <p:sp>
         <p:nvSpPr>
-          <p:cNvPr id="5" name="TextBox 4"/>
-          <p:cNvSpPr txBox="1"/>
-          <p:nvPr/>
-        </p:nvSpPr>
-        <p:spPr>
-          <a:xfrm>
-            <a:off x="1033619" y="3277448"/>
-            <a:ext cx="2389908" cy="1200329"/>
-          </a:xfrm>
-          <a:prstGeom prst="rect">
-            <a:avLst/>
-          </a:prstGeom>
-          <a:noFill/>
-        </p:spPr>
-        <p:txBody>
-          <a:bodyPr wrap="square" rtlCol="0">
-            <a:spAutoFit/>
-          </a:bodyPr>
-          <a:lstStyle/>
-          <a:p>
-            <a:r>
-              <a:rPr lang="en-US" dirty="0" smtClean="0"/>
-              <a:t>File-Level Granularity, F-Measure Percentage</a:t>
-            </a:r>
-          </a:p>
-          <a:p>
-            <a:endParaRPr lang="en-US" dirty="0"/>
-          </a:p>
-          <a:p>
-            <a:r>
-              <a:rPr lang="en-US" dirty="0" smtClean="0"/>
-              <a:t>Table</a:t>
-            </a:r>
-            <a:endParaRPr lang="en-US" dirty="0"/>
-          </a:p>
-        </p:txBody>
-      </p:sp>
-      <p:sp>
-        <p:nvSpPr>
           <p:cNvPr id="8" name="Rectangle 7"/>
           <p:cNvSpPr/>
           <p:nvPr/>
@@ -8968,6 +9055,91 @@
               <a:alpha val="25098"/>
             </a:srgbClr>
           </a:solidFill>
+        </p:spPr>
+        <p:style>
+          <a:lnRef idx="2">
+            <a:schemeClr val="accent1">
+              <a:shade val="50000"/>
+            </a:schemeClr>
+          </a:lnRef>
+          <a:fillRef idx="1">
+            <a:schemeClr val="accent1"/>
+          </a:fillRef>
+          <a:effectRef idx="0">
+            <a:schemeClr val="accent1"/>
+          </a:effectRef>
+          <a:fontRef idx="minor">
+            <a:schemeClr val="lt1"/>
+          </a:fontRef>
+        </p:style>
+        <p:txBody>
+          <a:bodyPr rtlCol="0" anchor="ctr"/>
+          <a:lstStyle/>
+          <a:p>
+            <a:pPr algn="ctr"/>
+            <a:endParaRPr lang="en-US"/>
+          </a:p>
+        </p:txBody>
+      </p:sp>
+      <p:sp>
+        <p:nvSpPr>
+          <p:cNvPr id="15" name="TextBox 14"/>
+          <p:cNvSpPr txBox="1"/>
+          <p:nvPr/>
+        </p:nvSpPr>
+        <p:spPr>
+          <a:xfrm>
+            <a:off x="159374" y="3098398"/>
+            <a:ext cx="3976208" cy="1569660"/>
+          </a:xfrm>
+          <a:prstGeom prst="rect">
+            <a:avLst/>
+          </a:prstGeom>
+          <a:noFill/>
+        </p:spPr>
+        <p:txBody>
+          <a:bodyPr wrap="square" rtlCol="0">
+            <a:spAutoFit/>
+          </a:bodyPr>
+          <a:lstStyle/>
+          <a:p>
+            <a:pPr algn="ctr"/>
+            <a:r>
+              <a:rPr lang="en-US" sz="3200" dirty="0" smtClean="0"/>
+              <a:t>File-Level Granularity, F-Measure </a:t>
+            </a:r>
+            <a:r>
+              <a:rPr lang="en-US" sz="3200" dirty="0" smtClean="0"/>
+              <a:t>Percentage</a:t>
+            </a:r>
+            <a:endParaRPr lang="en-US" sz="3200" dirty="0"/>
+          </a:p>
+          <a:p>
+            <a:pPr algn="ctr"/>
+            <a:r>
+              <a:rPr lang="en-US" sz="3200" dirty="0" smtClean="0"/>
+              <a:t>Table</a:t>
+            </a:r>
+            <a:endParaRPr lang="en-US" sz="3200" dirty="0"/>
+          </a:p>
+        </p:txBody>
+      </p:sp>
+      <p:sp>
+        <p:nvSpPr>
+          <p:cNvPr id="16" name="Rectangle 15">
+            <a:hlinkClick r:id="rId3" action="ppaction://hlinksldjump"/>
+          </p:cNvPr>
+          <p:cNvSpPr/>
+          <p:nvPr/>
+        </p:nvSpPr>
+        <p:spPr>
+          <a:xfrm>
+            <a:off x="71021" y="6447370"/>
+            <a:ext cx="355107" cy="363984"/>
+          </a:xfrm>
+          <a:prstGeom prst="rect">
+            <a:avLst/>
+          </a:prstGeom>
         </p:spPr>
         <p:style>
           <a:lnRef idx="2">
@@ -9075,45 +9247,6 @@
       </p:sp>
       <p:sp>
         <p:nvSpPr>
-          <p:cNvPr id="5" name="TextBox 4"/>
-          <p:cNvSpPr txBox="1"/>
-          <p:nvPr/>
-        </p:nvSpPr>
-        <p:spPr>
-          <a:xfrm>
-            <a:off x="859295" y="3277448"/>
-            <a:ext cx="2805546" cy="1200329"/>
-          </a:xfrm>
-          <a:prstGeom prst="rect">
-            <a:avLst/>
-          </a:prstGeom>
-          <a:noFill/>
-        </p:spPr>
-        <p:txBody>
-          <a:bodyPr wrap="square" rtlCol="0">
-            <a:spAutoFit/>
-          </a:bodyPr>
-          <a:lstStyle/>
-          <a:p>
-            <a:r>
-              <a:rPr lang="en-US" dirty="0" smtClean="0"/>
-              <a:t>Method-Level Granularity, F-Measure Percentage</a:t>
-            </a:r>
-          </a:p>
-          <a:p>
-            <a:endParaRPr lang="en-US" dirty="0"/>
-          </a:p>
-          <a:p>
-            <a:r>
-              <a:rPr lang="en-US" dirty="0" smtClean="0"/>
-              <a:t>Table</a:t>
-            </a:r>
-            <a:endParaRPr lang="en-US" dirty="0"/>
-          </a:p>
-        </p:txBody>
-      </p:sp>
-      <p:sp>
-        <p:nvSpPr>
           <p:cNvPr id="8" name="Rectangle 7"/>
           <p:cNvSpPr/>
           <p:nvPr/>
@@ -9356,6 +9489,91 @@
               <a:alpha val="25098"/>
             </a:srgbClr>
           </a:solidFill>
+        </p:spPr>
+        <p:style>
+          <a:lnRef idx="2">
+            <a:schemeClr val="accent1">
+              <a:shade val="50000"/>
+            </a:schemeClr>
+          </a:lnRef>
+          <a:fillRef idx="1">
+            <a:schemeClr val="accent1"/>
+          </a:fillRef>
+          <a:effectRef idx="0">
+            <a:schemeClr val="accent1"/>
+          </a:effectRef>
+          <a:fontRef idx="minor">
+            <a:schemeClr val="lt1"/>
+          </a:fontRef>
+        </p:style>
+        <p:txBody>
+          <a:bodyPr rtlCol="0" anchor="ctr"/>
+          <a:lstStyle/>
+          <a:p>
+            <a:pPr algn="ctr"/>
+            <a:endParaRPr lang="en-US"/>
+          </a:p>
+        </p:txBody>
+      </p:sp>
+      <p:sp>
+        <p:nvSpPr>
+          <p:cNvPr id="12" name="TextBox 11"/>
+          <p:cNvSpPr txBox="1"/>
+          <p:nvPr/>
+        </p:nvSpPr>
+        <p:spPr>
+          <a:xfrm>
+            <a:off x="159374" y="3098398"/>
+            <a:ext cx="3976208" cy="1569660"/>
+          </a:xfrm>
+          <a:prstGeom prst="rect">
+            <a:avLst/>
+          </a:prstGeom>
+          <a:noFill/>
+        </p:spPr>
+        <p:txBody>
+          <a:bodyPr wrap="square" rtlCol="0">
+            <a:spAutoFit/>
+          </a:bodyPr>
+          <a:lstStyle/>
+          <a:p>
+            <a:pPr algn="ctr"/>
+            <a:r>
+              <a:rPr lang="en-US" sz="3200" dirty="0" smtClean="0"/>
+              <a:t>Method</a:t>
+            </a:r>
+            <a:r>
+              <a:rPr lang="en-US" sz="3200" dirty="0" smtClean="0"/>
+              <a:t>-Level </a:t>
+            </a:r>
+            <a:r>
+              <a:rPr lang="en-US" sz="3200" dirty="0" smtClean="0"/>
+              <a:t>Granularity, F-Measure </a:t>
+            </a:r>
+            <a:r>
+              <a:rPr lang="en-US" sz="3200" dirty="0" smtClean="0"/>
+              <a:t>Percentage Table</a:t>
+            </a:r>
+            <a:endParaRPr lang="en-US" sz="3200" dirty="0"/>
+          </a:p>
+        </p:txBody>
+      </p:sp>
+      <p:sp>
+        <p:nvSpPr>
+          <p:cNvPr id="15" name="Rectangle 14">
+            <a:hlinkClick r:id="rId3" action="ppaction://hlinksldjump"/>
+          </p:cNvPr>
+          <p:cNvSpPr/>
+          <p:nvPr/>
+        </p:nvSpPr>
+        <p:spPr>
+          <a:xfrm>
+            <a:off x="71021" y="6447370"/>
+            <a:ext cx="355107" cy="363984"/>
+          </a:xfrm>
+          <a:prstGeom prst="rect">
+            <a:avLst/>
+          </a:prstGeom>
         </p:spPr>
         <p:style>
           <a:lnRef idx="2">
@@ -9569,14 +9787,194 @@
         </p:blipFill>
         <p:spPr>
           <a:xfrm>
-            <a:off x="2111692" y="2274311"/>
-            <a:ext cx="8029575" cy="3514725"/>
+            <a:off x="1425753" y="2012867"/>
+            <a:ext cx="9406900" cy="4117611"/>
           </a:xfrm>
           <a:prstGeom prst="rect">
             <a:avLst/>
           </a:prstGeom>
         </p:spPr>
       </p:pic>
+      <p:sp>
+        <p:nvSpPr>
+          <p:cNvPr id="3" name="Rectangle 2"/>
+          <p:cNvSpPr/>
+          <p:nvPr/>
+        </p:nvSpPr>
+        <p:spPr>
+          <a:xfrm>
+            <a:off x="3435375" y="2811795"/>
+            <a:ext cx="592828" cy="1372863"/>
+          </a:xfrm>
+          <a:prstGeom prst="rect">
+            <a:avLst/>
+          </a:prstGeom>
+          <a:solidFill>
+            <a:srgbClr val="FF0000">
+              <a:alpha val="20000"/>
+            </a:srgbClr>
+          </a:solidFill>
+        </p:spPr>
+        <p:style>
+          <a:lnRef idx="2">
+            <a:schemeClr val="accent1">
+              <a:shade val="50000"/>
+            </a:schemeClr>
+          </a:lnRef>
+          <a:fillRef idx="1">
+            <a:schemeClr val="accent1"/>
+          </a:fillRef>
+          <a:effectRef idx="0">
+            <a:schemeClr val="accent1"/>
+          </a:effectRef>
+          <a:fontRef idx="minor">
+            <a:schemeClr val="lt1"/>
+          </a:fontRef>
+        </p:style>
+        <p:txBody>
+          <a:bodyPr rtlCol="0" anchor="ctr"/>
+          <a:lstStyle/>
+          <a:p>
+            <a:pPr algn="ctr"/>
+            <a:endParaRPr lang="en-US"/>
+          </a:p>
+        </p:txBody>
+      </p:sp>
+      <p:sp>
+        <p:nvSpPr>
+          <p:cNvPr id="6" name="Rectangle 5"/>
+          <p:cNvSpPr/>
+          <p:nvPr/>
+        </p:nvSpPr>
+        <p:spPr>
+          <a:xfrm>
+            <a:off x="5362716" y="2805342"/>
+            <a:ext cx="1287925" cy="1372863"/>
+          </a:xfrm>
+          <a:prstGeom prst="rect">
+            <a:avLst/>
+          </a:prstGeom>
+          <a:solidFill>
+            <a:srgbClr val="FF0000">
+              <a:alpha val="20000"/>
+            </a:srgbClr>
+          </a:solidFill>
+        </p:spPr>
+        <p:style>
+          <a:lnRef idx="2">
+            <a:schemeClr val="accent1">
+              <a:shade val="50000"/>
+            </a:schemeClr>
+          </a:lnRef>
+          <a:fillRef idx="1">
+            <a:schemeClr val="accent1"/>
+          </a:fillRef>
+          <a:effectRef idx="0">
+            <a:schemeClr val="accent1"/>
+          </a:effectRef>
+          <a:fontRef idx="minor">
+            <a:schemeClr val="lt1"/>
+          </a:fontRef>
+        </p:style>
+        <p:txBody>
+          <a:bodyPr rtlCol="0" anchor="ctr"/>
+          <a:lstStyle/>
+          <a:p>
+            <a:pPr algn="ctr"/>
+            <a:endParaRPr lang="en-US"/>
+          </a:p>
+        </p:txBody>
+      </p:sp>
+      <p:sp>
+        <p:nvSpPr>
+          <p:cNvPr id="7" name="Rectangle 6"/>
+          <p:cNvSpPr/>
+          <p:nvPr/>
+        </p:nvSpPr>
+        <p:spPr>
+          <a:xfrm>
+            <a:off x="3372635" y="4184658"/>
+            <a:ext cx="592828" cy="1945820"/>
+          </a:xfrm>
+          <a:prstGeom prst="rect">
+            <a:avLst/>
+          </a:prstGeom>
+          <a:solidFill>
+            <a:srgbClr val="FF0000">
+              <a:alpha val="20000"/>
+            </a:srgbClr>
+          </a:solidFill>
+        </p:spPr>
+        <p:style>
+          <a:lnRef idx="2">
+            <a:schemeClr val="accent1">
+              <a:shade val="50000"/>
+            </a:schemeClr>
+          </a:lnRef>
+          <a:fillRef idx="1">
+            <a:schemeClr val="accent1"/>
+          </a:fillRef>
+          <a:effectRef idx="0">
+            <a:schemeClr val="accent1"/>
+          </a:effectRef>
+          <a:fontRef idx="minor">
+            <a:schemeClr val="lt1"/>
+          </a:fontRef>
+        </p:style>
+        <p:txBody>
+          <a:bodyPr rtlCol="0" anchor="ctr"/>
+          <a:lstStyle/>
+          <a:p>
+            <a:pPr algn="ctr"/>
+            <a:endParaRPr lang="en-US"/>
+          </a:p>
+        </p:txBody>
+      </p:sp>
+      <p:sp>
+        <p:nvSpPr>
+          <p:cNvPr id="8" name="Rectangle 7"/>
+          <p:cNvSpPr/>
+          <p:nvPr/>
+        </p:nvSpPr>
+        <p:spPr>
+          <a:xfrm>
+            <a:off x="5361054" y="4184658"/>
+            <a:ext cx="1287924" cy="1945820"/>
+          </a:xfrm>
+          <a:prstGeom prst="rect">
+            <a:avLst/>
+          </a:prstGeom>
+          <a:solidFill>
+            <a:srgbClr val="FF0000">
+              <a:alpha val="20000"/>
+            </a:srgbClr>
+          </a:solidFill>
+        </p:spPr>
+        <p:style>
+          <a:lnRef idx="2">
+            <a:schemeClr val="accent1">
+              <a:shade val="50000"/>
+            </a:schemeClr>
+          </a:lnRef>
+          <a:fillRef idx="1">
+            <a:schemeClr val="accent1"/>
+          </a:fillRef>
+          <a:effectRef idx="0">
+            <a:schemeClr val="accent1"/>
+          </a:effectRef>
+          <a:fontRef idx="minor">
+            <a:schemeClr val="lt1"/>
+          </a:fontRef>
+        </p:style>
+        <p:txBody>
+          <a:bodyPr rtlCol="0" anchor="ctr"/>
+          <a:lstStyle/>
+          <a:p>
+            <a:pPr algn="ctr"/>
+            <a:endParaRPr lang="en-US"/>
+          </a:p>
+        </p:txBody>
+      </p:sp>
     </p:spTree>
     <p:extLst>
       <p:ext uri="{BB962C8B-B14F-4D97-AF65-F5344CB8AC3E}">
@@ -9747,7 +10145,7 @@
         <p:spPr>
           <a:xfrm>
             <a:off x="363682" y="3709555"/>
-            <a:ext cx="1745673" cy="369332"/>
+            <a:ext cx="2112226" cy="1077218"/>
           </a:xfrm>
           <a:prstGeom prst="rect">
             <a:avLst/>
@@ -9761,10 +10159,10 @@
           <a:lstStyle/>
           <a:p>
             <a:r>
-              <a:rPr lang="en-US" dirty="0" smtClean="0"/>
+              <a:rPr lang="en-US" sz="3200" dirty="0" smtClean="0"/>
               <a:t>File Granularity</a:t>
             </a:r>
-            <a:endParaRPr lang="en-US" dirty="0"/>
+            <a:endParaRPr lang="en-US" sz="3200" dirty="0"/>
           </a:p>
         </p:txBody>
       </p:sp>
@@ -9776,8 +10174,8 @@
         </p:nvSpPr>
         <p:spPr>
           <a:xfrm>
-            <a:off x="9809018" y="3709555"/>
-            <a:ext cx="2078181" cy="369332"/>
+            <a:off x="9817896" y="3765323"/>
+            <a:ext cx="2078181" cy="1077218"/>
           </a:xfrm>
           <a:prstGeom prst="rect">
             <a:avLst/>
@@ -9791,10 +10189,52 @@
           <a:lstStyle/>
           <a:p>
             <a:r>
-              <a:rPr lang="en-US" dirty="0" smtClean="0"/>
+              <a:rPr lang="en-US" sz="3200" dirty="0" smtClean="0"/>
               <a:t>Method Granularity</a:t>
             </a:r>
-            <a:endParaRPr lang="en-US" dirty="0"/>
+            <a:endParaRPr lang="en-US" sz="3200" dirty="0"/>
+          </a:p>
+        </p:txBody>
+      </p:sp>
+      <p:sp>
+        <p:nvSpPr>
+          <p:cNvPr id="6" name="Rectangle 5">
+            <a:hlinkClick r:id="rId3" action="ppaction://hlinksldjump"/>
+          </p:cNvPr>
+          <p:cNvSpPr/>
+          <p:nvPr/>
+        </p:nvSpPr>
+        <p:spPr>
+          <a:xfrm>
+            <a:off x="71021" y="6447370"/>
+            <a:ext cx="355107" cy="363984"/>
+          </a:xfrm>
+          <a:prstGeom prst="rect">
+            <a:avLst/>
+          </a:prstGeom>
+        </p:spPr>
+        <p:style>
+          <a:lnRef idx="2">
+            <a:schemeClr val="accent1">
+              <a:shade val="50000"/>
+            </a:schemeClr>
+          </a:lnRef>
+          <a:fillRef idx="1">
+            <a:schemeClr val="accent1"/>
+          </a:fillRef>
+          <a:effectRef idx="0">
+            <a:schemeClr val="accent1"/>
+          </a:effectRef>
+          <a:fontRef idx="minor">
+            <a:schemeClr val="lt1"/>
+          </a:fontRef>
+        </p:style>
+        <p:txBody>
+          <a:bodyPr rtlCol="0" anchor="ctr"/>
+          <a:lstStyle/>
+          <a:p>
+            <a:pPr algn="ctr"/>
+            <a:endParaRPr lang="en-US"/>
           </a:p>
         </p:txBody>
       </p:sp>
@@ -9870,14 +10310,29 @@
           <a:p>
             <a:r>
               <a:rPr lang="en-US" dirty="0" smtClean="0"/>
-              <a:t> Combining conceptual and logical (evolutionary) couplings improved F-measure values:</a:t>
-            </a:r>
+              <a:t> Combining conceptual and logical (evolutionary) couplings improved F-measure values</a:t>
+            </a:r>
+            <a:r>
+              <a:rPr lang="en-US" dirty="0" smtClean="0"/>
+              <a:t>:  </a:t>
+            </a:r>
+            <a:r>
+              <a:rPr lang="en-US" dirty="0" smtClean="0">
+                <a:hlinkClick r:id="rId2" action="ppaction://hlinksldjump"/>
+              </a:rPr>
+              <a:t>        </a:t>
+            </a:r>
+            <a:endParaRPr lang="en-US" dirty="0" smtClean="0"/>
           </a:p>
           <a:p>
             <a:pPr lvl="1"/>
             <a:r>
               <a:rPr lang="en-US" sz="2800" dirty="0" smtClean="0"/>
-              <a:t>Up 3-17% vs. conceptual coupling</a:t>
+              <a:t>Up 3-17% vs. conceptual </a:t>
+            </a:r>
+            <a:r>
+              <a:rPr lang="en-US" sz="2800" dirty="0" smtClean="0"/>
+              <a:t>coupling, </a:t>
             </a:r>
           </a:p>
           <a:p>
@@ -9889,32 +10344,51 @@
           </a:p>
           <a:p>
             <a:r>
-              <a:rPr lang="en-US" dirty="0"/>
+              <a:rPr lang="en-US" dirty="0" smtClean="0"/>
               <a:t> </a:t>
             </a:r>
             <a:r>
               <a:rPr lang="en-US" dirty="0" smtClean="0"/>
-              <a:t>Disjunctive performed better than conjunctive.</a:t>
-            </a:r>
-          </a:p>
-          <a:p>
-            <a:r>
-              <a:rPr lang="en-US" dirty="0"/>
+              <a:t>Disjunctive performed better than conjunctive</a:t>
+            </a:r>
+            <a:r>
+              <a:rPr lang="en-US" dirty="0" smtClean="0"/>
+              <a:t>. </a:t>
+            </a:r>
+            <a:r>
+              <a:rPr lang="en-US" dirty="0" smtClean="0">
+                <a:hlinkClick r:id="rId3" action="ppaction://hlinksldjump"/>
+              </a:rPr>
+              <a:t>       </a:t>
+            </a:r>
+            <a:endParaRPr lang="en-US" dirty="0" smtClean="0"/>
+          </a:p>
+          <a:p>
+            <a:r>
+              <a:rPr lang="en-US" dirty="0" smtClean="0"/>
+              <a:t> File-level granularity saw better results than method-level granularity. </a:t>
+            </a:r>
+            <a:r>
+              <a:rPr lang="en-US" dirty="0" smtClean="0">
+                <a:hlinkClick r:id="rId4" action="ppaction://hlinksldjump"/>
+              </a:rPr>
+              <a:t>        </a:t>
+            </a:r>
+            <a:r>
+              <a:rPr lang="en-US" dirty="0" smtClean="0"/>
               <a:t> </a:t>
             </a:r>
-            <a:r>
-              <a:rPr lang="en-US" dirty="0" smtClean="0"/>
-              <a:t>File-level granularity saw better results than method-level granularity.</a:t>
-            </a:r>
-          </a:p>
-          <a:p>
-            <a:r>
-              <a:rPr lang="en-US" dirty="0"/>
-              <a:t> </a:t>
-            </a:r>
-            <a:r>
-              <a:rPr lang="en-US" dirty="0" smtClean="0"/>
-              <a:t>Using larger history across major releases for the training set impacted F-measure values, more noticeably at the method-level granularity.</a:t>
+          </a:p>
+          <a:p>
+            <a:r>
+              <a:rPr lang="en-US" dirty="0" smtClean="0"/>
+              <a:t> Using larger history across major releases for the training set impacted F-measure values, more noticeably at the method-level granularity. </a:t>
+            </a:r>
+            <a:r>
+              <a:rPr lang="en-US" dirty="0" smtClean="0">
+                <a:hlinkClick r:id="rId5" action="ppaction://hlinksldjump"/>
+              </a:rPr>
+              <a:t>          </a:t>
             </a:r>
             <a:endParaRPr lang="en-US" dirty="0"/>
           </a:p>
@@ -9985,18 +10459,19 @@
         </p:nvSpPr>
         <p:spPr>
           <a:xfrm>
-            <a:off x="633845" y="1845734"/>
-            <a:ext cx="11305310" cy="4023360"/>
-          </a:xfrm>
-        </p:spPr>
-        <p:txBody>
-          <a:bodyPr/>
-          <a:lstStyle/>
-          <a:p>
-            <a:r>
-              <a:rPr lang="en-US" dirty="0" smtClean="0"/>
-              <a:t> </a:t>
-            </a:r>
+            <a:off x="807867" y="1845734"/>
+            <a:ext cx="10999433" cy="4023360"/>
+          </a:xfrm>
+        </p:spPr>
+        <p:txBody>
+          <a:bodyPr>
+            <a:normAutofit/>
+          </a:bodyPr>
+          <a:lstStyle/>
+          <a:p>
+            <a:pPr marL="0" indent="0">
+              <a:buNone/>
+            </a:pPr>
             <a:r>
               <a:rPr lang="en-US" u="sng" dirty="0" smtClean="0"/>
               <a:t>Blending </a:t>
@@ -10019,8 +10494,18 @@
             </a:r>
             <a:r>
               <a:rPr lang="en-US" dirty="0" smtClean="0"/>
-              <a:t>, 2010</a:t>
-            </a:r>
+              <a:t>, </a:t>
+            </a:r>
+            <a:r>
+              <a:rPr lang="en-US" dirty="0" smtClean="0"/>
+              <a:t>2010</a:t>
+            </a:r>
+          </a:p>
+          <a:p>
+            <a:pPr marL="0" indent="0">
+              <a:buNone/>
+            </a:pPr>
+            <a:endParaRPr lang="en-US" sz="1200" dirty="0" smtClean="0"/>
           </a:p>
           <a:p>
             <a:pPr lvl="1"/>
@@ -10081,6 +10566,13 @@
   <p:clrMapOvr>
     <a:masterClrMapping/>
   </p:clrMapOvr>
+  <p:timing>
+    <p:tnLst>
+      <p:par>
+        <p:cTn id="1" dur="indefinite" restart="never" nodeType="tmRoot"/>
+      </p:par>
+    </p:tnLst>
+  </p:timing>
 </p:sld>
 </file>
 
@@ -10157,6 +10649,13 @@
   <p:clrMapOvr>
     <a:masterClrMapping/>
   </p:clrMapOvr>
+  <p:timing>
+    <p:tnLst>
+      <p:par>
+        <p:cTn id="1" dur="indefinite" restart="never" nodeType="tmRoot"/>
+      </p:par>
+    </p:tnLst>
+  </p:timing>
 </p:sld>
 </file>
 
@@ -10251,6 +10750,13 @@
   <p:clrMapOvr>
     <a:masterClrMapping/>
   </p:clrMapOvr>
+  <p:timing>
+    <p:tnLst>
+      <p:par>
+        <p:cTn id="1" dur="indefinite" restart="never" nodeType="tmRoot"/>
+      </p:par>
+    </p:tnLst>
+  </p:timing>
 </p:sld>
 </file>
 

</xml_diff>